<commit_message>
catered the sprint changes - s1/s2
</commit_message>
<xml_diff>
--- a/CustomerEngagements/beyondsoft/DR-Solution - editable.pptx
+++ b/CustomerEngagements/beyondsoft/DR-Solution - editable.pptx
@@ -307,7 +307,7 @@
               <a:pPr>
                 <a:defRPr/>
               </a:pPr>
-              <a:t>17.07.2023</a:t>
+              <a:t>18.07.2023</a:t>
             </a:fld>
             <a:endParaRPr lang="ru-RU"/>
           </a:p>
@@ -520,7 +520,7 @@
               <a:pPr>
                 <a:defRPr/>
               </a:pPr>
-              <a:t>7/17/2023</a:t>
+              <a:t>7/18/2023</a:t>
             </a:fld>
             <a:endParaRPr lang="en-US"/>
           </a:p>
@@ -9633,16 +9633,10 @@
           <a:p>
             <a:pPr algn="ctr"/>
             <a:r>
-              <a:rPr lang="en-US" sz="2400" dirty="0" err="1">
-                <a:latin typeface="+mn-lt"/>
-              </a:rPr>
-              <a:t>Postgresql</a:t>
-            </a:r>
-            <a:r>
               <a:rPr lang="en-US" sz="2400" dirty="0">
                 <a:latin typeface="+mn-lt"/>
               </a:rPr>
-              <a:t> + Metric DB + Log DB</a:t>
+              <a:t>Postgresql + Metric DB + Log DB</a:t>
             </a:r>
             <a:endParaRPr lang="en-IN" sz="2400" dirty="0">
               <a:latin typeface="+mn-lt"/>
@@ -11766,7 +11760,7 @@
         </p:nvSpPr>
         <p:spPr>
           <a:xfrm>
-            <a:off x="7553068" y="690732"/>
+            <a:off x="9438601" y="297944"/>
             <a:ext cx="7500890" cy="830997"/>
           </a:xfrm>
           <a:prstGeom prst="rect">
@@ -11780,6 +11774,7 @@
           </a:bodyPr>
           <a:lstStyle/>
           <a:p>
+            <a:pPr algn="ctr"/>
             <a:r>
               <a:rPr lang="en-US" sz="4800" b="1" dirty="0">
                 <a:solidFill>
@@ -11788,7 +11783,7 @@
                 <a:latin typeface="+mn-lt"/>
                 <a:cs typeface="Poppins Medium" panose="00000600000000000000" pitchFamily="2" charset="0"/>
               </a:rPr>
-              <a:t>Sample Project Timeline</a:t>
+              <a:t>Project Timeline</a:t>
             </a:r>
             <a:endParaRPr lang="ru-RU" sz="4800" b="1" dirty="0">
               <a:solidFill>
@@ -14455,20 +14450,8 @@
               <a:rPr lang="en-US" sz="1600" dirty="0">
                 <a:latin typeface="+mn-lt"/>
               </a:rPr>
-              <a:t>Implementation </a:t>
+              <a:t>INFRA PROVISIONING</a:t>
             </a:r>
-          </a:p>
-          <a:p>
-            <a:pPr algn="ctr"/>
-            <a:r>
-              <a:rPr lang="en-US" sz="1600" dirty="0">
-                <a:latin typeface="+mn-lt"/>
-              </a:rPr>
-              <a:t>IT 1 Modules</a:t>
-            </a:r>
-            <a:endParaRPr lang="en-IN" sz="1600" dirty="0">
-              <a:latin typeface="+mn-lt"/>
-            </a:endParaRPr>
           </a:p>
         </p:txBody>
       </p:sp>
@@ -14656,7 +14639,7 @@
               <a:rPr lang="en-US" sz="1600" dirty="0">
                 <a:latin typeface="+mn-lt"/>
               </a:rPr>
-              <a:t>Implementation</a:t>
+              <a:t>INFRASTRUCTURE </a:t>
             </a:r>
             <a:endParaRPr lang="en-IN" sz="1600" dirty="0">
               <a:latin typeface="+mn-lt"/>
@@ -15079,7 +15062,7 @@
         <p:spPr>
           <a:xfrm>
             <a:off x="2961241" y="8896713"/>
-            <a:ext cx="1921221" cy="1077218"/>
+            <a:ext cx="1921221" cy="1323439"/>
           </a:xfrm>
           <a:prstGeom prst="rect">
             <a:avLst/>
@@ -15100,7 +15083,7 @@
               <a:rPr lang="en-US" sz="1600" dirty="0">
                 <a:latin typeface="+mn-lt"/>
               </a:rPr>
-              <a:t>Implement IT 1 Modules</a:t>
+              <a:t>Provision DRS infrastructure</a:t>
             </a:r>
           </a:p>
           <a:p>
@@ -15112,24 +15095,9 @@
               <a:rPr lang="en-US" sz="1600" dirty="0">
                 <a:latin typeface="+mn-lt"/>
               </a:rPr>
-              <a:t>Deployment</a:t>
+              <a:t>Provision Cross Region replication </a:t>
             </a:r>
           </a:p>
-          <a:p>
-            <a:pPr marL="285750" indent="-285750">
-              <a:buFont typeface="Arial" panose="020B0604020202020204" pitchFamily="34" charset="0"/>
-              <a:buChar char="•"/>
-            </a:pPr>
-            <a:r>
-              <a:rPr lang="en-US" sz="1600" dirty="0">
-                <a:latin typeface="+mn-lt"/>
-              </a:rPr>
-              <a:t>User Guide</a:t>
-            </a:r>
-            <a:endParaRPr lang="en-IN" sz="1600" dirty="0">
-              <a:latin typeface="+mn-lt"/>
-            </a:endParaRPr>
-          </a:p>
         </p:txBody>
       </p:sp>
       <p:sp>
@@ -15146,7 +15114,7 @@
         </p:nvSpPr>
         <p:spPr>
           <a:xfrm>
-            <a:off x="2750942" y="10332890"/>
+            <a:off x="2735926" y="10403494"/>
             <a:ext cx="1850409" cy="338554"/>
           </a:xfrm>
           <a:prstGeom prst="rect">
@@ -15187,8 +15155,8 @@
         </p:nvSpPr>
         <p:spPr>
           <a:xfrm>
-            <a:off x="2961241" y="10671444"/>
-            <a:ext cx="1850408" cy="584775"/>
+            <a:off x="2961241" y="10813737"/>
+            <a:ext cx="1850408" cy="830997"/>
           </a:xfrm>
           <a:prstGeom prst="rect">
             <a:avLst/>
@@ -15209,23 +15177,8 @@
               <a:rPr lang="en-US" sz="1600" dirty="0">
                 <a:latin typeface="+mn-lt"/>
               </a:rPr>
-              <a:t>IT 1 Modules </a:t>
+              <a:t>Provisioned Infra and DRS setup.</a:t>
             </a:r>
-          </a:p>
-          <a:p>
-            <a:pPr marL="285750" indent="-285750">
-              <a:buFont typeface="Arial" panose="020B0604020202020204" pitchFamily="34" charset="0"/>
-              <a:buChar char="•"/>
-            </a:pPr>
-            <a:r>
-              <a:rPr lang="en-US" sz="1600" dirty="0">
-                <a:latin typeface="+mn-lt"/>
-              </a:rPr>
-              <a:t>User Guide</a:t>
-            </a:r>
-            <a:endParaRPr lang="en-IN" sz="1600" dirty="0">
-              <a:latin typeface="+mn-lt"/>
-            </a:endParaRPr>
           </a:p>
         </p:txBody>
       </p:sp>
@@ -15410,20 +15363,8 @@
               <a:rPr lang="en-US" sz="1600" dirty="0">
                 <a:latin typeface="+mn-lt"/>
               </a:rPr>
-              <a:t>Implementation </a:t>
+              <a:t>Automation Backbone</a:t>
             </a:r>
-          </a:p>
-          <a:p>
-            <a:pPr algn="ctr"/>
-            <a:r>
-              <a:rPr lang="en-US" sz="1600" dirty="0">
-                <a:latin typeface="+mn-lt"/>
-              </a:rPr>
-              <a:t>IT 2 Modules</a:t>
-            </a:r>
-            <a:endParaRPr lang="en-IN" sz="1600" dirty="0">
-              <a:latin typeface="+mn-lt"/>
-            </a:endParaRPr>
           </a:p>
         </p:txBody>
       </p:sp>
@@ -15496,8 +15437,8 @@
         </p:nvSpPr>
         <p:spPr>
           <a:xfrm>
-            <a:off x="6307679" y="6988715"/>
-            <a:ext cx="1848860" cy="338554"/>
+            <a:off x="6321748" y="6858001"/>
+            <a:ext cx="1848860" cy="584775"/>
           </a:xfrm>
           <a:prstGeom prst="rect">
             <a:avLst/>
@@ -15515,7 +15456,7 @@
               <a:rPr lang="en-US" sz="1600" dirty="0">
                 <a:latin typeface="+mn-lt"/>
               </a:rPr>
-              <a:t>Implementation</a:t>
+              <a:t>Automate with Step/Lambda</a:t>
             </a:r>
             <a:endParaRPr lang="en-IN" sz="1600" dirty="0">
               <a:latin typeface="+mn-lt"/>
@@ -15655,7 +15596,7 @@
         </p:nvSpPr>
         <p:spPr>
           <a:xfrm>
-            <a:off x="5877165" y="10332890"/>
+            <a:off x="5861910" y="10450318"/>
             <a:ext cx="1850409" cy="338554"/>
           </a:xfrm>
           <a:prstGeom prst="rect">
@@ -15696,7 +15637,7 @@
         </p:nvSpPr>
         <p:spPr>
           <a:xfrm>
-            <a:off x="6087464" y="10671444"/>
+            <a:off x="6189087" y="10885061"/>
             <a:ext cx="1850408" cy="584775"/>
           </a:xfrm>
           <a:prstGeom prst="rect">
@@ -15718,9 +15659,38 @@
               <a:rPr lang="en-US" sz="1600" dirty="0">
                 <a:latin typeface="+mn-lt"/>
               </a:rPr>
-              <a:t>IT 2 Modules </a:t>
+              <a:t>Automation Scripts</a:t>
             </a:r>
           </a:p>
+        </p:txBody>
+      </p:sp>
+      <p:sp>
+        <p:nvSpPr>
+          <p:cNvPr id="1085" name="TextBox 1084">
+            <a:extLst>
+              <a:ext uri="{FF2B5EF4-FFF2-40B4-BE49-F238E27FC236}">
+                <a16:creationId xmlns:a16="http://schemas.microsoft.com/office/drawing/2014/main" id="{9D49E1FB-4749-AE68-97F4-E4B9580F7C5C}"/>
+              </a:ext>
+            </a:extLst>
+          </p:cNvPr>
+          <p:cNvSpPr txBox="1"/>
+          <p:nvPr/>
+        </p:nvSpPr>
+        <p:spPr>
+          <a:xfrm>
+            <a:off x="6018119" y="8953255"/>
+            <a:ext cx="2054760" cy="1323439"/>
+          </a:xfrm>
+          <a:prstGeom prst="rect">
+            <a:avLst/>
+          </a:prstGeom>
+          <a:noFill/>
+        </p:spPr>
+        <p:txBody>
+          <a:bodyPr wrap="square" rtlCol="0">
+            <a:spAutoFit/>
+          </a:bodyPr>
+          <a:lstStyle/>
           <a:p>
             <a:pPr marL="285750" indent="-285750">
               <a:buFont typeface="Arial" panose="020B0604020202020204" pitchFamily="34" charset="0"/>
@@ -15730,79 +15700,8 @@
               <a:rPr lang="en-US" sz="1600" dirty="0">
                 <a:latin typeface="+mn-lt"/>
               </a:rPr>
-              <a:t>User Guide</a:t>
+              <a:t>Develop Automations routine in  Aws step and lambda</a:t>
             </a:r>
-            <a:endParaRPr lang="en-IN" sz="1600" dirty="0">
-              <a:latin typeface="+mn-lt"/>
-            </a:endParaRPr>
-          </a:p>
-        </p:txBody>
-      </p:sp>
-      <p:sp>
-        <p:nvSpPr>
-          <p:cNvPr id="1085" name="TextBox 1084">
-            <a:extLst>
-              <a:ext uri="{FF2B5EF4-FFF2-40B4-BE49-F238E27FC236}">
-                <a16:creationId xmlns:a16="http://schemas.microsoft.com/office/drawing/2014/main" id="{9D49E1FB-4749-AE68-97F4-E4B9580F7C5C}"/>
-              </a:ext>
-            </a:extLst>
-          </p:cNvPr>
-          <p:cNvSpPr txBox="1"/>
-          <p:nvPr/>
-        </p:nvSpPr>
-        <p:spPr>
-          <a:xfrm>
-            <a:off x="6018119" y="8953255"/>
-            <a:ext cx="2054760" cy="1077218"/>
-          </a:xfrm>
-          <a:prstGeom prst="rect">
-            <a:avLst/>
-          </a:prstGeom>
-          <a:noFill/>
-        </p:spPr>
-        <p:txBody>
-          <a:bodyPr wrap="square" rtlCol="0">
-            <a:spAutoFit/>
-          </a:bodyPr>
-          <a:lstStyle/>
-          <a:p>
-            <a:pPr marL="285750" indent="-285750">
-              <a:buFont typeface="Arial" panose="020B0604020202020204" pitchFamily="34" charset="0"/>
-              <a:buChar char="•"/>
-            </a:pPr>
-            <a:r>
-              <a:rPr lang="en-US" sz="1600" dirty="0">
-                <a:latin typeface="+mn-lt"/>
-              </a:rPr>
-              <a:t>Implement IT 2 Modules</a:t>
-            </a:r>
-          </a:p>
-          <a:p>
-            <a:pPr marL="285750" indent="-285750">
-              <a:buFont typeface="Arial" panose="020B0604020202020204" pitchFamily="34" charset="0"/>
-              <a:buChar char="•"/>
-            </a:pPr>
-            <a:r>
-              <a:rPr lang="en-US" sz="1600" dirty="0">
-                <a:latin typeface="+mn-lt"/>
-              </a:rPr>
-              <a:t>Deployment</a:t>
-            </a:r>
-          </a:p>
-          <a:p>
-            <a:pPr marL="285750" indent="-285750">
-              <a:buFont typeface="Arial" panose="020B0604020202020204" pitchFamily="34" charset="0"/>
-              <a:buChar char="•"/>
-            </a:pPr>
-            <a:r>
-              <a:rPr lang="en-US" sz="1600" dirty="0">
-                <a:latin typeface="+mn-lt"/>
-              </a:rPr>
-              <a:t>User Guide</a:t>
-            </a:r>
-            <a:endParaRPr lang="en-IN" sz="1600" dirty="0">
-              <a:latin typeface="+mn-lt"/>
-            </a:endParaRPr>
           </a:p>
         </p:txBody>
       </p:sp>

</xml_diff>